<commit_message>
More serious this time
</commit_message>
<xml_diff>
--- a/Website/a20/isaac/Whither redesign.pptx
+++ b/Website/a20/isaac/Whither redesign.pptx
@@ -2419,9 +2419,12 @@
 <p:sldMaster xmlns:a="http://schemas.openxmlformats.org/drawingml/2006/main" xmlns:r="http://schemas.openxmlformats.org/officeDocument/2006/relationships" xmlns:p="http://schemas.openxmlformats.org/presentationml/2006/main">
   <p:cSld>
     <p:bg>
-      <p:bgRef idx="1001">
-        <a:schemeClr val="bg1"/>
-      </p:bgRef>
+      <p:bgPr>
+        <a:solidFill>
+          <a:srgbClr val="F8F8F2"/>
+        </a:solidFill>
+        <a:effectLst/>
+      </p:bgPr>
     </p:bg>
     <p:spTree>
       <p:nvGrpSpPr>
@@ -3078,30 +3081,35 @@
           </a:p>
         </p:txBody>
       </p:sp>
-      <p:sp>
-        <p:nvSpPr>
-          <p:cNvPr id="3" name="Content Placeholder 2"/>
-          <p:cNvSpPr>
-            <a:spLocks noGrp="1"/>
-          </p:cNvSpPr>
+      <p:pic>
+        <p:nvPicPr>
+          <p:cNvPr id="5" name="Content Placeholder 4"/>
+          <p:cNvPicPr>
+            <a:picLocks noGrp="1" noChangeAspect="1"/>
+          </p:cNvPicPr>
           <p:nvPr>
             <p:ph idx="1"/>
           </p:nvPr>
-        </p:nvSpPr>
-        <p:spPr/>
-        <p:txBody>
-          <a:bodyPr>
-            <a:normAutofit/>
-          </a:bodyPr>
-          <a:lstStyle/>
-          <a:p>
-            <a:pPr marL="0" indent="0">
-              <a:buNone/>
-            </a:pPr>
-            <a:endParaRPr lang="en-US" dirty="0" smtClean="0"/>
-          </a:p>
-        </p:txBody>
-      </p:sp>
+        </p:nvPicPr>
+        <p:blipFill>
+          <a:blip r:embed="rId2">
+            <a:extLst>
+              <a:ext uri="{28A0092B-C50C-407E-A947-70E740481C1C}">
+                <a14:useLocalDpi xmlns:a14="http://schemas.microsoft.com/office/drawing/2010/main" val="0"/>
+              </a:ext>
+            </a:extLst>
+          </a:blip>
+          <a:stretch>
+            <a:fillRect/>
+          </a:stretch>
+        </p:blipFill>
+        <p:spPr>
+          <a:xfrm>
+            <a:off x="6745288" y="1900237"/>
+            <a:ext cx="3048000" cy="3048000"/>
+          </a:xfrm>
+        </p:spPr>
+      </p:pic>
       <p:sp>
         <p:nvSpPr>
           <p:cNvPr id="4" name="Text Placeholder 3"/>
@@ -3274,14 +3282,6 @@
 <file path=ppt/slides/slide4.xml><?xml version="1.0" encoding="utf-8"?>
 <p:sld xmlns:a="http://schemas.openxmlformats.org/drawingml/2006/main" xmlns:r="http://schemas.openxmlformats.org/officeDocument/2006/relationships" xmlns:p="http://schemas.openxmlformats.org/presentationml/2006/main">
   <p:cSld>
-    <p:bg>
-      <p:bgPr>
-        <a:solidFill>
-          <a:srgbClr val="FFFFFF"/>
-        </a:solidFill>
-        <a:effectLst/>
-      </p:bgPr>
-    </p:bg>
     <p:spTree>
       <p:nvGrpSpPr>
         <p:cNvPr id="1" name=""/>
@@ -3317,7 +3317,7 @@
       </p:sp>
       <p:pic>
         <p:nvPicPr>
-          <p:cNvPr id="4" name="why am i doing this">
+          <p:cNvPr id="5" name="why am i doing this - no more parties in la">
             <a:hlinkClick r:id="" action="ppaction://media"/>
           </p:cNvPr>
           <p:cNvPicPr>
@@ -3341,7 +3341,7 @@
         </p:blipFill>
         <p:spPr>
           <a:xfrm>
-            <a:off x="3920331" y="1835067"/>
+            <a:off x="3921125" y="1825625"/>
             <a:ext cx="4351338" cy="4351338"/>
           </a:xfrm>
         </p:spPr>
@@ -3366,7 +3366,7 @@
                 <p:stCondLst>
                   <p:cond evt="onClick" delay="0">
                     <p:tgtEl>
-                      <p:spTgt spid="4"/>
+                      <p:spTgt spid="5"/>
                     </p:tgtEl>
                   </p:cond>
                 </p:stCondLst>
@@ -3396,7 +3396,7 @@
                                       <p:cBhvr>
                                         <p:cTn id="6" dur="1" fill="hold"/>
                                         <p:tgtEl>
-                                          <p:spTgt spid="4"/>
+                                          <p:spTgt spid="5"/>
                                         </p:tgtEl>
                                       </p:cBhvr>
                                     </p:cmd>
@@ -3414,7 +3414,7 @@
               <p:nextCondLst>
                 <p:cond evt="onClick" delay="0">
                   <p:tgtEl>
-                    <p:spTgt spid="4"/>
+                    <p:spTgt spid="5"/>
                   </p:tgtEl>
                 </p:cond>
               </p:nextCondLst>
@@ -3427,7 +3427,7 @@
                   </p:stCondLst>
                 </p:cTn>
                 <p:tgtEl>
-                  <p:spTgt spid="4"/>
+                  <p:spTgt spid="5"/>
                 </p:tgtEl>
               </p:cMediaNode>
             </p:video>

</xml_diff>